<commit_message>
capstone project 1 report
</commit_message>
<xml_diff>
--- a/project_report/capstone_project_1.pptx
+++ b/project_report/capstone_project_1.pptx
@@ -220,7 +220,7 @@
           <a:p>
             <a:fld id="{8C5409F7-8A42-334A-9A35-CDCD26D8F5B6}" type="datetimeFigureOut">
               <a:rPr lang="en-US" smtClean="0"/>
-              <a:t>6/25/18</a:t>
+              <a:t>6/28/18</a:t>
             </a:fld>
             <a:endParaRPr lang="en-US"/>
           </a:p>
@@ -386,7 +386,7 @@
           <a:p>
             <a:fld id="{88D627A7-C818-CC46-BF9E-FFCBC18694EF}" type="datetimeFigureOut">
               <a:rPr lang="en-US" smtClean="0"/>
-              <a:t>6/25/18</a:t>
+              <a:t>6/28/18</a:t>
             </a:fld>
             <a:endParaRPr lang="en-US"/>
           </a:p>
@@ -1046,7 +1046,7 @@
           <a:p>
             <a:fld id="{1DE16B7A-8F59-8D49-BDDE-C30A4662DF63}" type="datetime1">
               <a:rPr lang="en-US" smtClean="0"/>
-              <a:t>6/25/18</a:t>
+              <a:t>6/28/18</a:t>
             </a:fld>
             <a:endParaRPr lang="en-US"/>
           </a:p>
@@ -1228,7 +1228,7 @@
           <a:p>
             <a:fld id="{35CDE18B-8933-F748-AD93-76E8F4890288}" type="datetime1">
               <a:rPr lang="en-US" smtClean="0"/>
-              <a:t>6/25/18</a:t>
+              <a:t>6/28/18</a:t>
             </a:fld>
             <a:endParaRPr lang="en-US"/>
           </a:p>
@@ -1420,7 +1420,7 @@
           <a:p>
             <a:fld id="{DEF5E011-D49E-0941-B5D3-6D830CD4C789}" type="datetime1">
               <a:rPr lang="en-US" smtClean="0"/>
-              <a:t>6/25/18</a:t>
+              <a:t>6/28/18</a:t>
             </a:fld>
             <a:endParaRPr lang="en-US"/>
           </a:p>
@@ -1616,7 +1616,7 @@
           <a:p>
             <a:fld id="{F8C80C10-3DE3-5646-932E-22828465665E}" type="datetime1">
               <a:rPr lang="en-US" smtClean="0"/>
-              <a:t>6/25/18</a:t>
+              <a:t>6/28/18</a:t>
             </a:fld>
             <a:endParaRPr lang="en-US"/>
           </a:p>
@@ -1792,7 +1792,7 @@
           <a:p>
             <a:fld id="{54976B97-139E-8140-9501-B81258BA356B}" type="datetime1">
               <a:rPr lang="en-US" smtClean="0"/>
-              <a:t>6/25/18</a:t>
+              <a:t>6/28/18</a:t>
             </a:fld>
             <a:endParaRPr lang="en-US"/>
           </a:p>
@@ -2044,7 +2044,7 @@
           <a:p>
             <a:fld id="{44D389EB-5F37-D94A-A715-7BC2C2DB693D}" type="datetime1">
               <a:rPr lang="en-US" smtClean="0"/>
-              <a:t>6/25/18</a:t>
+              <a:t>6/28/18</a:t>
             </a:fld>
             <a:endParaRPr lang="en-US"/>
           </a:p>
@@ -2275,7 +2275,7 @@
           <a:p>
             <a:fld id="{AD426A52-8A13-1447-8010-36E3AA17560A}" type="datetime1">
               <a:rPr lang="en-US" smtClean="0"/>
-              <a:t>6/25/18</a:t>
+              <a:t>6/28/18</a:t>
             </a:fld>
             <a:endParaRPr lang="en-US"/>
           </a:p>
@@ -2648,7 +2648,7 @@
           <a:p>
             <a:fld id="{045B1E73-3410-7648-ADB4-DC12A2205A15}" type="datetime1">
               <a:rPr lang="en-US" smtClean="0"/>
-              <a:t>6/25/18</a:t>
+              <a:t>6/28/18</a:t>
             </a:fld>
             <a:endParaRPr lang="en-US"/>
           </a:p>
@@ -2772,7 +2772,7 @@
           <a:p>
             <a:fld id="{A453D074-DB0F-B347-B37A-DF94F6702CEF}" type="datetime1">
               <a:rPr lang="en-US" smtClean="0"/>
-              <a:t>6/25/18</a:t>
+              <a:t>6/28/18</a:t>
             </a:fld>
             <a:endParaRPr lang="en-US"/>
           </a:p>
@@ -2897,7 +2897,7 @@
           <a:p>
             <a:fld id="{A453D074-DB0F-B347-B37A-DF94F6702CEF}" type="datetime1">
               <a:rPr lang="en-US" smtClean="0"/>
-              <a:t>6/25/18</a:t>
+              <a:t>6/28/18</a:t>
             </a:fld>
             <a:endParaRPr lang="en-US"/>
           </a:p>
@@ -3022,7 +3022,7 @@
           <a:p>
             <a:fld id="{5A8073D3-C7BC-D643-B99C-2708432ECFAA}" type="datetime1">
               <a:rPr lang="en-US" smtClean="0"/>
-              <a:t>6/25/18</a:t>
+              <a:t>6/28/18</a:t>
             </a:fld>
             <a:endParaRPr lang="en-US"/>
           </a:p>
@@ -3199,7 +3199,7 @@
           <a:p>
             <a:fld id="{E9DFA6A9-26D3-624E-B792-461E0FDBA8B2}" type="datetime1">
               <a:rPr lang="en-US" smtClean="0"/>
-              <a:t>6/25/18</a:t>
+              <a:t>6/28/18</a:t>
             </a:fld>
             <a:endParaRPr lang="en-US"/>
           </a:p>
@@ -3298,7 +3298,7 @@
           <a:p>
             <a:fld id="{2DED4779-B2D0-9143-AA2B-A5F112B41723}" type="datetime1">
               <a:rPr lang="en-US" smtClean="0"/>
-              <a:t>6/25/18</a:t>
+              <a:t>6/28/18</a:t>
             </a:fld>
             <a:endParaRPr lang="en-US"/>
           </a:p>
@@ -3574,7 +3574,7 @@
           <a:p>
             <a:fld id="{ACAA0147-13BE-114C-9BE0-9DBF4ED131DB}" type="datetime1">
               <a:rPr lang="en-US" smtClean="0"/>
-              <a:t>6/25/18</a:t>
+              <a:t>6/28/18</a:t>
             </a:fld>
             <a:endParaRPr lang="en-US"/>
           </a:p>
@@ -3830,7 +3830,7 @@
           <a:p>
             <a:fld id="{3A00A78E-52A2-BF45-983A-0D962D3BA694}" type="datetime1">
               <a:rPr lang="en-US" smtClean="0"/>
-              <a:t>6/25/18</a:t>
+              <a:t>6/28/18</a:t>
             </a:fld>
             <a:endParaRPr lang="en-US"/>
           </a:p>
@@ -3999,7 +3999,7 @@
           <a:p>
             <a:fld id="{BE7545DC-FB8A-0941-85CD-A4324F15E264}" type="datetime1">
               <a:rPr lang="en-US" smtClean="0"/>
-              <a:t>6/25/18</a:t>
+              <a:t>6/28/18</a:t>
             </a:fld>
             <a:endParaRPr lang="en-US"/>
           </a:p>
@@ -4178,7 +4178,7 @@
           <a:p>
             <a:fld id="{C09AAB36-7D31-7C48-87E1-74C9674B3B15}" type="datetime1">
               <a:rPr lang="en-US" smtClean="0"/>
-              <a:t>6/25/18</a:t>
+              <a:t>6/28/18</a:t>
             </a:fld>
             <a:endParaRPr lang="en-US"/>
           </a:p>
@@ -4369,7 +4369,7 @@
           <a:p>
             <a:fld id="{C796A040-D99B-734F-824A-C42646506EF6}" type="datetimeFigureOut">
               <a:rPr lang="en-US" smtClean="0"/>
-              <a:t>6/25/18</a:t>
+              <a:t>6/28/18</a:t>
             </a:fld>
             <a:endParaRPr lang="en-US"/>
           </a:p>
@@ -4539,7 +4539,7 @@
           <a:p>
             <a:fld id="{C796A040-D99B-734F-824A-C42646506EF6}" type="datetimeFigureOut">
               <a:rPr lang="en-US" smtClean="0"/>
-              <a:t>6/25/18</a:t>
+              <a:t>6/28/18</a:t>
             </a:fld>
             <a:endParaRPr lang="en-US"/>
           </a:p>
@@ -4785,7 +4785,7 @@
           <a:p>
             <a:fld id="{C796A040-D99B-734F-824A-C42646506EF6}" type="datetimeFigureOut">
               <a:rPr lang="en-US" smtClean="0"/>
-              <a:t>6/25/18</a:t>
+              <a:t>6/28/18</a:t>
             </a:fld>
             <a:endParaRPr lang="en-US"/>
           </a:p>
@@ -5017,7 +5017,7 @@
           <a:p>
             <a:fld id="{C796A040-D99B-734F-824A-C42646506EF6}" type="datetimeFigureOut">
               <a:rPr lang="en-US" smtClean="0"/>
-              <a:t>6/25/18</a:t>
+              <a:t>6/28/18</a:t>
             </a:fld>
             <a:endParaRPr lang="en-US"/>
           </a:p>
@@ -5384,7 +5384,7 @@
           <a:p>
             <a:fld id="{C796A040-D99B-734F-824A-C42646506EF6}" type="datetimeFigureOut">
               <a:rPr lang="en-US" smtClean="0"/>
-              <a:t>6/25/18</a:t>
+              <a:t>6/28/18</a:t>
             </a:fld>
             <a:endParaRPr lang="en-US"/>
           </a:p>
@@ -5638,7 +5638,7 @@
           <a:p>
             <a:fld id="{0329579A-BDB5-6541-AD8B-179F0770DB9D}" type="datetime1">
               <a:rPr lang="en-US" smtClean="0"/>
-              <a:t>6/25/18</a:t>
+              <a:t>6/28/18</a:t>
             </a:fld>
             <a:endParaRPr lang="en-US"/>
           </a:p>
@@ -5760,7 +5760,7 @@
           <a:p>
             <a:fld id="{C796A040-D99B-734F-824A-C42646506EF6}" type="datetimeFigureOut">
               <a:rPr lang="en-US" smtClean="0"/>
-              <a:t>6/25/18</a:t>
+              <a:t>6/28/18</a:t>
             </a:fld>
             <a:endParaRPr lang="en-US"/>
           </a:p>
@@ -5855,7 +5855,7 @@
           <a:p>
             <a:fld id="{C796A040-D99B-734F-824A-C42646506EF6}" type="datetimeFigureOut">
               <a:rPr lang="en-US" smtClean="0"/>
-              <a:t>6/25/18</a:t>
+              <a:t>6/28/18</a:t>
             </a:fld>
             <a:endParaRPr lang="en-US"/>
           </a:p>
@@ -6132,7 +6132,7 @@
           <a:p>
             <a:fld id="{C796A040-D99B-734F-824A-C42646506EF6}" type="datetimeFigureOut">
               <a:rPr lang="en-US" smtClean="0"/>
-              <a:t>6/25/18</a:t>
+              <a:t>6/28/18</a:t>
             </a:fld>
             <a:endParaRPr lang="en-US"/>
           </a:p>
@@ -6385,7 +6385,7 @@
           <a:p>
             <a:fld id="{C796A040-D99B-734F-824A-C42646506EF6}" type="datetimeFigureOut">
               <a:rPr lang="en-US" smtClean="0"/>
-              <a:t>6/25/18</a:t>
+              <a:t>6/28/18</a:t>
             </a:fld>
             <a:endParaRPr lang="en-US"/>
           </a:p>
@@ -6555,7 +6555,7 @@
           <a:p>
             <a:fld id="{C796A040-D99B-734F-824A-C42646506EF6}" type="datetimeFigureOut">
               <a:rPr lang="en-US" smtClean="0"/>
-              <a:t>6/25/18</a:t>
+              <a:t>6/28/18</a:t>
             </a:fld>
             <a:endParaRPr lang="en-US"/>
           </a:p>
@@ -6735,7 +6735,7 @@
           <a:p>
             <a:fld id="{C796A040-D99B-734F-824A-C42646506EF6}" type="datetimeFigureOut">
               <a:rPr lang="en-US" smtClean="0"/>
-              <a:t>6/25/18</a:t>
+              <a:t>6/28/18</a:t>
             </a:fld>
             <a:endParaRPr lang="en-US"/>
           </a:p>
@@ -6975,7 +6975,7 @@
           <a:p>
             <a:fld id="{32B5E43A-0538-3641-B1C0-894F281FD124}" type="datetime1">
               <a:rPr lang="en-US" smtClean="0"/>
-              <a:t>6/25/18</a:t>
+              <a:t>6/28/18</a:t>
             </a:fld>
             <a:endParaRPr lang="en-US"/>
           </a:p>
@@ -7354,7 +7354,7 @@
           <a:p>
             <a:fld id="{94D83BEA-AF26-5042-B0FD-CC4464917E16}" type="datetime1">
               <a:rPr lang="en-US" smtClean="0"/>
-              <a:t>6/25/18</a:t>
+              <a:t>6/28/18</a:t>
             </a:fld>
             <a:endParaRPr lang="en-US"/>
           </a:p>
@@ -7484,7 +7484,7 @@
           <a:p>
             <a:fld id="{7BDBB7FB-0C01-F44F-86D3-1AA030022633}" type="datetime1">
               <a:rPr lang="en-US" smtClean="0"/>
-              <a:t>6/25/18</a:t>
+              <a:t>6/28/18</a:t>
             </a:fld>
             <a:endParaRPr lang="en-US"/>
           </a:p>
@@ -7598,7 +7598,7 @@
           <a:p>
             <a:fld id="{FE80A9FC-21FB-AC41-8FCE-06961E44E875}" type="datetime1">
               <a:rPr lang="en-US" smtClean="0"/>
-              <a:t>6/25/18</a:t>
+              <a:t>6/28/18</a:t>
             </a:fld>
             <a:endParaRPr lang="en-US"/>
           </a:p>
@@ -7894,7 +7894,7 @@
           <a:p>
             <a:fld id="{66FEF535-D6B9-024B-AE58-7A075C291EA6}" type="datetime1">
               <a:rPr lang="en-US" smtClean="0"/>
-              <a:t>6/25/18</a:t>
+              <a:t>6/28/18</a:t>
             </a:fld>
             <a:endParaRPr lang="en-US"/>
           </a:p>
@@ -8159,7 +8159,7 @@
           <a:p>
             <a:fld id="{1D441CEC-FAD7-4948-B52B-71BE83836950}" type="datetime1">
               <a:rPr lang="en-US" smtClean="0"/>
-              <a:t>6/25/18</a:t>
+              <a:t>6/28/18</a:t>
             </a:fld>
             <a:endParaRPr lang="en-US"/>
           </a:p>
@@ -8894,7 +8894,7 @@
           <a:p>
             <a:fld id="{A453D074-DB0F-B347-B37A-DF94F6702CEF}" type="datetime1">
               <a:rPr lang="en-US" smtClean="0"/>
-              <a:t>6/25/18</a:t>
+              <a:t>6/28/18</a:t>
             </a:fld>
             <a:endParaRPr lang="en-US"/>
           </a:p>
@@ -9444,7 +9444,7 @@
           <a:p>
             <a:fld id="{C796A040-D99B-734F-824A-C42646506EF6}" type="datetimeFigureOut">
               <a:rPr lang="en-US" smtClean="0"/>
-              <a:t>6/25/18</a:t>
+              <a:t>6/28/18</a:t>
             </a:fld>
             <a:endParaRPr lang="en-US"/>
           </a:p>
@@ -10114,11 +10114,7 @@
             </a:pPr>
             <a:r>
               <a:rPr lang="en-US" sz="2400" dirty="0" smtClean="0"/>
-              <a:t> Demand </a:t>
-            </a:r>
-            <a:r>
-              <a:rPr lang="en-US" sz="2400" dirty="0" smtClean="0"/>
-              <a:t>increases with temperature and it starts declining at very high temperature.</a:t>
+              <a:t> Demand increases with temperature and it starts declining at very high temperature.</a:t>
             </a:r>
           </a:p>
         </p:txBody>
@@ -10214,7 +10210,6 @@
               <a:rPr lang="en-US" sz="2400" dirty="0"/>
               <a:t>in Spring Season</a:t>
             </a:r>
-            <a:endParaRPr lang="en-US" sz="2400" dirty="0"/>
           </a:p>
         </p:txBody>
       </p:sp>
@@ -10458,11 +10453,7 @@
             </a:pPr>
             <a:r>
               <a:rPr lang="en-US" sz="2400" dirty="0" smtClean="0"/>
-              <a:t>Demand is lowest in </a:t>
-            </a:r>
-            <a:r>
-              <a:rPr lang="en-US" sz="2400" dirty="0" smtClean="0"/>
-              <a:t>Stormy Weather</a:t>
+              <a:t>Demand is lowest in Stormy Weather</a:t>
             </a:r>
             <a:endParaRPr lang="en-US" sz="2400" dirty="0"/>
           </a:p>
@@ -10564,7 +10555,11 @@
           <a:p>
             <a:r>
               <a:rPr lang="en-US" dirty="0" smtClean="0"/>
-              <a:t>Model Evaluation</a:t>
+              <a:t>Model </a:t>
+            </a:r>
+            <a:r>
+              <a:rPr lang="en-US" dirty="0" smtClean="0"/>
+              <a:t>Evaluation &amp; Selection</a:t>
             </a:r>
             <a:endParaRPr lang="en-US" dirty="0"/>
           </a:p>
@@ -11038,7 +11033,7 @@
             </a:r>
             <a:r>
               <a:rPr lang="en-US" dirty="0" smtClean="0"/>
-              <a:t>Evaluation</a:t>
+              <a:t>Evaluation &amp; Selection</a:t>
             </a:r>
             <a:endParaRPr lang="en-US" dirty="0"/>
           </a:p>
@@ -11155,7 +11150,6 @@
               <a:rPr lang="en-US" sz="2000" dirty="0"/>
               <a:t>=25</a:t>
             </a:r>
-            <a:endParaRPr lang="en-US" sz="2000" dirty="0"/>
           </a:p>
           <a:p>
             <a:pPr lvl="1"/>
@@ -11540,7 +11534,6 @@
               <a:rPr lang="en-US" dirty="0"/>
               <a:t>Model Evaluation</a:t>
             </a:r>
-            <a:endParaRPr lang="en-US" dirty="0"/>
           </a:p>
         </p:txBody>
       </p:sp>
@@ -11772,7 +11765,6 @@
               <a:rPr lang="en-US" sz="2400" dirty="0" smtClean="0"/>
               <a:t>sharing in city</a:t>
             </a:r>
-            <a:endParaRPr lang="en-US" sz="2400" dirty="0" smtClean="0"/>
           </a:p>
           <a:p>
             <a:pPr lvl="1">
@@ -11786,7 +11778,6 @@
               <a:rPr lang="en-US" sz="1800" dirty="0" smtClean="0"/>
               <a:t>Registered Ridership</a:t>
             </a:r>
-            <a:endParaRPr lang="en-US" sz="1800" dirty="0" smtClean="0"/>
           </a:p>
           <a:p>
             <a:pPr lvl="1">
@@ -11811,17 +11802,8 @@
             </a:pPr>
             <a:r>
               <a:rPr lang="en-US" sz="1800" dirty="0" smtClean="0"/>
-              <a:t>Evening Commute Hours (4 </a:t>
-            </a:r>
-            <a:r>
-              <a:rPr lang="en-US" sz="1800" dirty="0" smtClean="0"/>
-              <a:t>and 8 </a:t>
-            </a:r>
-            <a:r>
-              <a:rPr lang="en-US" sz="1800" dirty="0" smtClean="0"/>
-              <a:t>PM)</a:t>
-            </a:r>
-            <a:endParaRPr lang="en-US" sz="1800" dirty="0" smtClean="0"/>
+              <a:t>Evening Commute Hours (4 and 8 PM)</a:t>
+            </a:r>
           </a:p>
           <a:p>
             <a:pPr lvl="1">
@@ -11833,13 +11815,8 @@
             </a:pPr>
             <a:r>
               <a:rPr lang="en-US" sz="1800" dirty="0" smtClean="0"/>
-              <a:t>Clear </a:t>
-            </a:r>
-            <a:r>
-              <a:rPr lang="en-US" sz="1800" dirty="0" smtClean="0"/>
-              <a:t>Weather Conditions</a:t>
-            </a:r>
-            <a:endParaRPr lang="en-US" sz="1800" dirty="0" smtClean="0"/>
+              <a:t>Clear Weather Conditions</a:t>
+            </a:r>
           </a:p>
           <a:p>
             <a:pPr lvl="1">
@@ -11853,7 +11830,6 @@
               <a:rPr lang="en-US" sz="1800" dirty="0" smtClean="0"/>
               <a:t>Season</a:t>
             </a:r>
-            <a:endParaRPr lang="en-US" sz="1800" dirty="0" smtClean="0"/>
           </a:p>
           <a:p>
             <a:pPr lvl="1">
@@ -12354,13 +12330,8 @@
             </a:pPr>
             <a:r>
               <a:rPr lang="en-US" sz="2200" dirty="0" smtClean="0"/>
-              <a:t>Data for capstone project is a historical log of rentals for year </a:t>
-            </a:r>
-            <a:r>
-              <a:rPr lang="en-US" sz="2200" dirty="0" smtClean="0"/>
-              <a:t>2011, 2012.</a:t>
-            </a:r>
-            <a:endParaRPr lang="en-US" sz="2200" dirty="0" smtClean="0"/>
+              <a:t>Data for capstone project is a historical log of rentals for year 2011, 2012.</a:t>
+            </a:r>
           </a:p>
           <a:p>
             <a:pPr lvl="1">
@@ -12670,11 +12641,7 @@
             </a:pPr>
             <a:r>
               <a:rPr lang="en-US" sz="2200" dirty="0" smtClean="0"/>
-              <a:t>Scale bike stations to be able to meet </a:t>
-            </a:r>
-            <a:r>
-              <a:rPr lang="en-US" sz="2200" dirty="0" smtClean="0"/>
-              <a:t>demand</a:t>
+              <a:t>Scale bike stations to be able to meet demand</a:t>
             </a:r>
           </a:p>
           <a:p>
@@ -12701,19 +12668,7 @@
             </a:pPr>
             <a:r>
               <a:rPr lang="en-US" sz="2200" dirty="0" smtClean="0"/>
-              <a:t>Help </a:t>
-            </a:r>
-            <a:r>
-              <a:rPr lang="en-US" sz="2200" dirty="0" smtClean="0"/>
-              <a:t>convert casual riders to </a:t>
-            </a:r>
-            <a:r>
-              <a:rPr lang="en-US" sz="2200" dirty="0" smtClean="0"/>
-              <a:t>membership/registered </a:t>
-            </a:r>
-            <a:r>
-              <a:rPr lang="en-US" sz="2200" dirty="0" smtClean="0"/>
-              <a:t>riders</a:t>
+              <a:t>Help convert casual riders to membership/registered riders</a:t>
             </a:r>
           </a:p>
           <a:p>
@@ -12728,7 +12683,6 @@
               <a:rPr lang="en-US" sz="2200" dirty="0" smtClean="0"/>
               <a:t>Retain existing registered riders</a:t>
             </a:r>
-            <a:endParaRPr lang="en-US" sz="2200" dirty="0" smtClean="0"/>
           </a:p>
           <a:p>
             <a:pPr lvl="1">
@@ -12763,11 +12717,7 @@
             </a:pPr>
             <a:r>
               <a:rPr lang="en-US" sz="2200" dirty="0" smtClean="0"/>
-              <a:t>Manage city transit services based on bike </a:t>
-            </a:r>
-            <a:r>
-              <a:rPr lang="en-US" sz="2200" dirty="0" smtClean="0"/>
-              <a:t>demand</a:t>
+              <a:t>Manage city transit services based on bike demand</a:t>
             </a:r>
           </a:p>
           <a:p>
@@ -13764,15 +13714,7 @@
             </a:pPr>
             <a:r>
               <a:rPr lang="en-US" sz="2400" dirty="0" smtClean="0"/>
-              <a:t>   (divides </a:t>
-            </a:r>
-            <a:r>
-              <a:rPr lang="en-US" sz="2400" dirty="0" smtClean="0"/>
-              <a:t>a day </a:t>
-            </a:r>
-            <a:r>
-              <a:rPr lang="en-US" sz="2400" dirty="0" smtClean="0"/>
-              <a:t>in 6 windows/periods) </a:t>
+              <a:t>   (divides a day in 6 windows/periods) </a:t>
             </a:r>
           </a:p>
           <a:p>
@@ -14045,11 +13987,7 @@
           <a:p>
             <a:r>
               <a:rPr lang="en-US" dirty="0" smtClean="0"/>
-              <a:t>Weekdays </a:t>
-            </a:r>
-            <a:r>
-              <a:rPr lang="en-US" dirty="0" smtClean="0"/>
-              <a:t>Data Analysis</a:t>
+              <a:t>Weekdays Data Analysis</a:t>
             </a:r>
             <a:endParaRPr lang="en-US" dirty="0"/>
           </a:p>
@@ -14402,19 +14340,7 @@
             </a:pPr>
             <a:r>
               <a:rPr lang="en-US" sz="2400" dirty="0" smtClean="0"/>
-              <a:t> Evening </a:t>
-            </a:r>
-            <a:r>
-              <a:rPr lang="en-US" sz="2400" dirty="0" smtClean="0"/>
-              <a:t>Hours have higher </a:t>
-            </a:r>
-            <a:r>
-              <a:rPr lang="en-US" sz="2400" dirty="0" smtClean="0"/>
-              <a:t>demand</a:t>
-            </a:r>
-            <a:r>
-              <a:rPr lang="en-US" sz="2400" dirty="0" smtClean="0"/>
-              <a:t> </a:t>
+              <a:t> Evening Hours have higher demand </a:t>
             </a:r>
           </a:p>
           <a:p>
@@ -14428,7 +14354,6 @@
               <a:rPr lang="en-US" sz="2400" dirty="0" smtClean="0"/>
               <a:t>    than Mornings</a:t>
             </a:r>
-            <a:endParaRPr lang="en-US" sz="2400" dirty="0" smtClean="0"/>
           </a:p>
           <a:p>
             <a:pPr marL="800100" lvl="1" indent="-342900">

</xml_diff>